<commit_message>
Flask UI + Backloop data table+ pagination gh
</commit_message>
<xml_diff>
--- a/Presentations/Presentation10.pptx
+++ b/Presentations/Presentation10.pptx
@@ -8,7 +8,8 @@
     <p:sldId id="261" r:id="rId2"/>
     <p:sldId id="263" r:id="rId3"/>
     <p:sldId id="258" r:id="rId4"/>
-    <p:sldId id="262" r:id="rId5"/>
+    <p:sldId id="264" r:id="rId5"/>
+    <p:sldId id="262" r:id="rId6"/>
   </p:sldIdLst>
   <p:sldSz cx="12192000" cy="6858000"/>
   <p:notesSz cx="6858000" cy="9144000"/>
@@ -4746,7 +4747,346 @@
         </p:nvSpPr>
         <p:spPr>
           <a:xfrm>
-            <a:off x="6361043" y="5474081"/>
+            <a:off x="3497471" y="5378434"/>
+            <a:ext cx="1964266" cy="314531"/>
+          </a:xfrm>
+          <a:prstGeom prst="ellipse">
+            <a:avLst/>
+          </a:prstGeom>
+          <a:solidFill>
+            <a:schemeClr val="accent4">
+              <a:lumMod val="60000"/>
+              <a:lumOff val="40000"/>
+            </a:schemeClr>
+          </a:solidFill>
+        </p:spPr>
+        <p:style>
+          <a:lnRef idx="2">
+            <a:schemeClr val="accent1">
+              <a:shade val="50000"/>
+            </a:schemeClr>
+          </a:lnRef>
+          <a:fillRef idx="1">
+            <a:schemeClr val="accent1"/>
+          </a:fillRef>
+          <a:effectRef idx="0">
+            <a:schemeClr val="accent1"/>
+          </a:effectRef>
+          <a:fontRef idx="minor">
+            <a:schemeClr val="lt1"/>
+          </a:fontRef>
+        </p:style>
+        <p:txBody>
+          <a:bodyPr rtlCol="0" anchor="ctr"/>
+          <a:lstStyle/>
+          <a:p>
+            <a:pPr algn="ctr"/>
+            <a:r>
+              <a:rPr lang="en-US" sz="1200" dirty="0"/>
+              <a:t>Unwanted Activity</a:t>
+            </a:r>
+          </a:p>
+        </p:txBody>
+      </p:sp>
+      <p:sp>
+        <p:nvSpPr>
+          <p:cNvPr id="31" name="Oval 30">
+            <a:extLst>
+              <a:ext uri="{FF2B5EF4-FFF2-40B4-BE49-F238E27FC236}">
+                <a16:creationId xmlns:a16="http://schemas.microsoft.com/office/drawing/2014/main" id="{02BAB4FD-266E-774B-B0EF-EBE0B28DE267}"/>
+              </a:ext>
+            </a:extLst>
+          </p:cNvPr>
+          <p:cNvSpPr/>
+          <p:nvPr/>
+        </p:nvSpPr>
+        <p:spPr>
+          <a:xfrm>
+            <a:off x="823843" y="3890362"/>
+            <a:ext cx="1964266" cy="314531"/>
+          </a:xfrm>
+          <a:prstGeom prst="ellipse">
+            <a:avLst/>
+          </a:prstGeom>
+          <a:solidFill>
+            <a:schemeClr val="accent2">
+              <a:lumMod val="60000"/>
+              <a:lumOff val="40000"/>
+            </a:schemeClr>
+          </a:solidFill>
+        </p:spPr>
+        <p:style>
+          <a:lnRef idx="2">
+            <a:schemeClr val="accent1">
+              <a:shade val="50000"/>
+            </a:schemeClr>
+          </a:lnRef>
+          <a:fillRef idx="1">
+            <a:schemeClr val="accent1"/>
+          </a:fillRef>
+          <a:effectRef idx="0">
+            <a:schemeClr val="accent1"/>
+          </a:effectRef>
+          <a:fontRef idx="minor">
+            <a:schemeClr val="lt1"/>
+          </a:fontRef>
+        </p:style>
+        <p:txBody>
+          <a:bodyPr rtlCol="0" anchor="ctr"/>
+          <a:lstStyle/>
+          <a:p>
+            <a:pPr algn="ctr"/>
+            <a:r>
+              <a:rPr lang="en-US" sz="1200" dirty="0"/>
+              <a:t>Back-loop</a:t>
+            </a:r>
+          </a:p>
+        </p:txBody>
+      </p:sp>
+      <p:sp>
+        <p:nvSpPr>
+          <p:cNvPr id="33" name="Oval 32">
+            <a:extLst>
+              <a:ext uri="{FF2B5EF4-FFF2-40B4-BE49-F238E27FC236}">
+                <a16:creationId xmlns:a16="http://schemas.microsoft.com/office/drawing/2014/main" id="{8480F789-BB61-9546-A6A2-1F30AE19A913}"/>
+              </a:ext>
+            </a:extLst>
+          </p:cNvPr>
+          <p:cNvSpPr/>
+          <p:nvPr/>
+        </p:nvSpPr>
+        <p:spPr>
+          <a:xfrm>
+            <a:off x="8912272" y="3516581"/>
+            <a:ext cx="1964266" cy="314531"/>
+          </a:xfrm>
+          <a:prstGeom prst="ellipse">
+            <a:avLst/>
+          </a:prstGeom>
+          <a:solidFill>
+            <a:schemeClr val="accent6">
+              <a:lumMod val="60000"/>
+              <a:lumOff val="40000"/>
+            </a:schemeClr>
+          </a:solidFill>
+        </p:spPr>
+        <p:style>
+          <a:lnRef idx="2">
+            <a:schemeClr val="accent1">
+              <a:shade val="50000"/>
+            </a:schemeClr>
+          </a:lnRef>
+          <a:fillRef idx="1">
+            <a:schemeClr val="accent1"/>
+          </a:fillRef>
+          <a:effectRef idx="0">
+            <a:schemeClr val="accent1"/>
+          </a:effectRef>
+          <a:fontRef idx="minor">
+            <a:schemeClr val="lt1"/>
+          </a:fontRef>
+        </p:style>
+        <p:txBody>
+          <a:bodyPr rtlCol="0" anchor="ctr"/>
+          <a:lstStyle/>
+          <a:p>
+            <a:pPr algn="ctr"/>
+            <a:r>
+              <a:rPr lang="en-US" sz="1200" dirty="0"/>
+              <a:t>Incorrect resource</a:t>
+            </a:r>
+          </a:p>
+        </p:txBody>
+      </p:sp>
+      <p:sp>
+        <p:nvSpPr>
+          <p:cNvPr id="35" name="Oval 34">
+            <a:extLst>
+              <a:ext uri="{FF2B5EF4-FFF2-40B4-BE49-F238E27FC236}">
+                <a16:creationId xmlns:a16="http://schemas.microsoft.com/office/drawing/2014/main" id="{5B59102A-019A-0048-BD02-85E93AAE09DE}"/>
+              </a:ext>
+            </a:extLst>
+          </p:cNvPr>
+          <p:cNvSpPr/>
+          <p:nvPr/>
+        </p:nvSpPr>
+        <p:spPr>
+          <a:xfrm>
+            <a:off x="823843" y="2660704"/>
+            <a:ext cx="1964266" cy="314531"/>
+          </a:xfrm>
+          <a:prstGeom prst="ellipse">
+            <a:avLst/>
+          </a:prstGeom>
+          <a:solidFill>
+            <a:schemeClr val="accent2">
+              <a:lumMod val="60000"/>
+              <a:lumOff val="40000"/>
+            </a:schemeClr>
+          </a:solidFill>
+        </p:spPr>
+        <p:style>
+          <a:lnRef idx="2">
+            <a:schemeClr val="accent1">
+              <a:shade val="50000"/>
+            </a:schemeClr>
+          </a:lnRef>
+          <a:fillRef idx="1">
+            <a:schemeClr val="accent1"/>
+          </a:fillRef>
+          <a:effectRef idx="0">
+            <a:schemeClr val="accent1"/>
+          </a:effectRef>
+          <a:fontRef idx="minor">
+            <a:schemeClr val="lt1"/>
+          </a:fontRef>
+        </p:style>
+        <p:txBody>
+          <a:bodyPr rtlCol="0" anchor="ctr"/>
+          <a:lstStyle/>
+          <a:p>
+            <a:pPr algn="ctr"/>
+            <a:r>
+              <a:rPr lang="en-IN" sz="1200" dirty="0"/>
+              <a:t>Parallelizable tasks</a:t>
+            </a:r>
+            <a:r>
+              <a:rPr lang="en-IN" sz="1200" dirty="0">
+                <a:effectLst/>
+              </a:rPr>
+              <a:t> </a:t>
+            </a:r>
+            <a:endParaRPr lang="en-US" sz="1200" dirty="0"/>
+          </a:p>
+        </p:txBody>
+      </p:sp>
+      <p:sp>
+        <p:nvSpPr>
+          <p:cNvPr id="36" name="Oval 35">
+            <a:extLst>
+              <a:ext uri="{FF2B5EF4-FFF2-40B4-BE49-F238E27FC236}">
+                <a16:creationId xmlns:a16="http://schemas.microsoft.com/office/drawing/2014/main" id="{7E3F7F01-4BD9-9641-8084-C2542CBB9DFE}"/>
+              </a:ext>
+            </a:extLst>
+          </p:cNvPr>
+          <p:cNvSpPr/>
+          <p:nvPr/>
+        </p:nvSpPr>
+        <p:spPr>
+          <a:xfrm>
+            <a:off x="2573867" y="2194042"/>
+            <a:ext cx="1964266" cy="314531"/>
+          </a:xfrm>
+          <a:prstGeom prst="ellipse">
+            <a:avLst/>
+          </a:prstGeom>
+        </p:spPr>
+        <p:style>
+          <a:lnRef idx="2">
+            <a:schemeClr val="accent1">
+              <a:shade val="50000"/>
+            </a:schemeClr>
+          </a:lnRef>
+          <a:fillRef idx="1">
+            <a:schemeClr val="accent1"/>
+          </a:fillRef>
+          <a:effectRef idx="0">
+            <a:schemeClr val="accent1"/>
+          </a:effectRef>
+          <a:fontRef idx="minor">
+            <a:schemeClr val="lt1"/>
+          </a:fontRef>
+        </p:style>
+        <p:txBody>
+          <a:bodyPr rtlCol="0" anchor="ctr"/>
+          <a:lstStyle/>
+          <a:p>
+            <a:pPr algn="ctr"/>
+            <a:r>
+              <a:rPr lang="en-IN" sz="1200" dirty="0"/>
+              <a:t>Bottle Neck </a:t>
+            </a:r>
+            <a:endParaRPr lang="en-US" sz="1200" dirty="0"/>
+          </a:p>
+        </p:txBody>
+      </p:sp>
+      <p:sp>
+        <p:nvSpPr>
+          <p:cNvPr id="37" name="Oval 36">
+            <a:extLst>
+              <a:ext uri="{FF2B5EF4-FFF2-40B4-BE49-F238E27FC236}">
+                <a16:creationId xmlns:a16="http://schemas.microsoft.com/office/drawing/2014/main" id="{95F88D9C-2782-314F-A098-2B632BCBD228}"/>
+              </a:ext>
+            </a:extLst>
+          </p:cNvPr>
+          <p:cNvSpPr/>
+          <p:nvPr/>
+        </p:nvSpPr>
+        <p:spPr>
+          <a:xfrm>
+            <a:off x="1280308" y="5349429"/>
+            <a:ext cx="1964266" cy="314531"/>
+          </a:xfrm>
+          <a:prstGeom prst="ellipse">
+            <a:avLst/>
+          </a:prstGeom>
+          <a:solidFill>
+            <a:schemeClr val="accent4">
+              <a:lumMod val="60000"/>
+              <a:lumOff val="40000"/>
+            </a:schemeClr>
+          </a:solidFill>
+        </p:spPr>
+        <p:style>
+          <a:lnRef idx="2">
+            <a:schemeClr val="accent1">
+              <a:shade val="50000"/>
+            </a:schemeClr>
+          </a:lnRef>
+          <a:fillRef idx="1">
+            <a:schemeClr val="accent1"/>
+          </a:fillRef>
+          <a:effectRef idx="0">
+            <a:schemeClr val="accent1"/>
+          </a:effectRef>
+          <a:fontRef idx="minor">
+            <a:schemeClr val="lt1"/>
+          </a:fontRef>
+        </p:style>
+        <p:txBody>
+          <a:bodyPr rtlCol="0" anchor="ctr"/>
+          <a:lstStyle/>
+          <a:p>
+            <a:pPr algn="ctr"/>
+            <a:r>
+              <a:rPr lang="en-IN" sz="1200" dirty="0"/>
+              <a:t>Variance of Process Time</a:t>
+            </a:r>
+            <a:r>
+              <a:rPr lang="en-IN" sz="1200" dirty="0">
+                <a:effectLst/>
+              </a:rPr>
+              <a:t> </a:t>
+            </a:r>
+            <a:endParaRPr lang="en-US" sz="1200" dirty="0"/>
+          </a:p>
+        </p:txBody>
+      </p:sp>
+      <p:sp>
+        <p:nvSpPr>
+          <p:cNvPr id="38" name="Oval 37">
+            <a:extLst>
+              <a:ext uri="{FF2B5EF4-FFF2-40B4-BE49-F238E27FC236}">
+                <a16:creationId xmlns:a16="http://schemas.microsoft.com/office/drawing/2014/main" id="{D601A953-E6B1-6E44-A9EA-D81D4B43E20E}"/>
+              </a:ext>
+            </a:extLst>
+          </p:cNvPr>
+          <p:cNvSpPr/>
+          <p:nvPr/>
+        </p:nvSpPr>
+        <p:spPr>
+          <a:xfrm>
+            <a:off x="6443502" y="5379367"/>
             <a:ext cx="1964266" cy="314531"/>
           </a:xfrm>
           <a:prstGeom prst="ellipse">
@@ -4781,19 +5121,18 @@
           <a:p>
             <a:pPr algn="ctr"/>
             <a:r>
-              <a:rPr lang="en-US" sz="1200"/>
-              <a:t>Unwanted Activity</a:t>
-            </a:r>
-            <a:endParaRPr lang="en-US" sz="1200" dirty="0"/>
-          </a:p>
-        </p:txBody>
-      </p:sp>
-      <p:sp>
-        <p:nvSpPr>
-          <p:cNvPr id="31" name="Oval 30">
-            <a:extLst>
-              <a:ext uri="{FF2B5EF4-FFF2-40B4-BE49-F238E27FC236}">
-                <a16:creationId xmlns:a16="http://schemas.microsoft.com/office/drawing/2014/main" id="{02BAB4FD-266E-774B-B0EF-EBE0B28DE267}"/>
+              <a:rPr lang="en-US" sz="1200" dirty="0"/>
+              <a:t>Idle time</a:t>
+            </a:r>
+          </a:p>
+        </p:txBody>
+      </p:sp>
+      <p:sp>
+        <p:nvSpPr>
+          <p:cNvPr id="39" name="Oval 38">
+            <a:extLst>
+              <a:ext uri="{FF2B5EF4-FFF2-40B4-BE49-F238E27FC236}">
+                <a16:creationId xmlns:a16="http://schemas.microsoft.com/office/drawing/2014/main" id="{221D7254-A02C-BE41-84A7-D1C5539FAD19}"/>
               </a:ext>
             </a:extLst>
           </p:cNvPr>
@@ -4802,7 +5141,7 @@
         </p:nvSpPr>
         <p:spPr>
           <a:xfrm>
-            <a:off x="8940801" y="2867058"/>
+            <a:off x="8879324" y="2791052"/>
             <a:ext cx="1964266" cy="314531"/>
           </a:xfrm>
           <a:prstGeom prst="ellipse">
@@ -4837,18 +5176,19 @@
           <a:p>
             <a:pPr algn="ctr"/>
             <a:r>
-              <a:rPr lang="en-US" sz="1200" dirty="0"/>
-              <a:t>Back-loop</a:t>
-            </a:r>
-          </a:p>
-        </p:txBody>
-      </p:sp>
-      <p:sp>
-        <p:nvSpPr>
-          <p:cNvPr id="33" name="Oval 32">
-            <a:extLst>
-              <a:ext uri="{FF2B5EF4-FFF2-40B4-BE49-F238E27FC236}">
-                <a16:creationId xmlns:a16="http://schemas.microsoft.com/office/drawing/2014/main" id="{8480F789-BB61-9546-A6A2-1F30AE19A913}"/>
+              <a:rPr lang="en-IN" sz="1200" dirty="0"/>
+              <a:t>Interface or media change</a:t>
+            </a:r>
+            <a:endParaRPr lang="en-US" sz="1200" dirty="0"/>
+          </a:p>
+        </p:txBody>
+      </p:sp>
+      <p:sp>
+        <p:nvSpPr>
+          <p:cNvPr id="40" name="Oval 39">
+            <a:extLst>
+              <a:ext uri="{FF2B5EF4-FFF2-40B4-BE49-F238E27FC236}">
+                <a16:creationId xmlns:a16="http://schemas.microsoft.com/office/drawing/2014/main" id="{703B7FD6-EEF4-F842-916C-A4B5C736A004}"/>
               </a:ext>
             </a:extLst>
           </p:cNvPr>
@@ -4857,62 +5197,7 @@
         </p:nvSpPr>
         <p:spPr>
           <a:xfrm>
-            <a:off x="8926444" y="5892102"/>
-            <a:ext cx="1964266" cy="314531"/>
-          </a:xfrm>
-          <a:prstGeom prst="ellipse">
-            <a:avLst/>
-          </a:prstGeom>
-          <a:solidFill>
-            <a:schemeClr val="accent5">
-              <a:lumMod val="60000"/>
-              <a:lumOff val="40000"/>
-            </a:schemeClr>
-          </a:solidFill>
-        </p:spPr>
-        <p:style>
-          <a:lnRef idx="2">
-            <a:schemeClr val="accent1">
-              <a:shade val="50000"/>
-            </a:schemeClr>
-          </a:lnRef>
-          <a:fillRef idx="1">
-            <a:schemeClr val="accent1"/>
-          </a:fillRef>
-          <a:effectRef idx="0">
-            <a:schemeClr val="accent1"/>
-          </a:effectRef>
-          <a:fontRef idx="minor">
-            <a:schemeClr val="lt1"/>
-          </a:fontRef>
-        </p:style>
-        <p:txBody>
-          <a:bodyPr rtlCol="0" anchor="ctr"/>
-          <a:lstStyle/>
-          <a:p>
-            <a:pPr algn="ctr"/>
-            <a:r>
-              <a:rPr lang="en-US" sz="1200" dirty="0"/>
-              <a:t>Incorrect resource</a:t>
-            </a:r>
-          </a:p>
-        </p:txBody>
-      </p:sp>
-      <p:sp>
-        <p:nvSpPr>
-          <p:cNvPr id="35" name="Oval 34">
-            <a:extLst>
-              <a:ext uri="{FF2B5EF4-FFF2-40B4-BE49-F238E27FC236}">
-                <a16:creationId xmlns:a16="http://schemas.microsoft.com/office/drawing/2014/main" id="{5B59102A-019A-0048-BD02-85E93AAE09DE}"/>
-              </a:ext>
-            </a:extLst>
-          </p:cNvPr>
-          <p:cNvSpPr/>
-          <p:nvPr/>
-        </p:nvSpPr>
-        <p:spPr>
-          <a:xfrm>
-            <a:off x="9025467" y="3572807"/>
+            <a:off x="8942088" y="4071010"/>
             <a:ext cx="1964266" cy="314531"/>
           </a:xfrm>
           <a:prstGeom prst="ellipse">
@@ -4948,7 +5233,7 @@
             <a:pPr algn="ctr"/>
             <a:r>
               <a:rPr lang="en-IN" sz="1200" dirty="0"/>
-              <a:t>Parallelizable tasks</a:t>
+              <a:t>Redundant Activity</a:t>
             </a:r>
             <a:r>
               <a:rPr lang="en-IN" sz="1200" dirty="0">
@@ -4962,10 +5247,10 @@
       </p:sp>
       <p:sp>
         <p:nvSpPr>
-          <p:cNvPr id="36" name="Oval 35">
-            <a:extLst>
-              <a:ext uri="{FF2B5EF4-FFF2-40B4-BE49-F238E27FC236}">
-                <a16:creationId xmlns:a16="http://schemas.microsoft.com/office/drawing/2014/main" id="{7E3F7F01-4BD9-9641-8084-C2542CBB9DFE}"/>
+          <p:cNvPr id="41" name="Oval 40">
+            <a:extLst>
+              <a:ext uri="{FF2B5EF4-FFF2-40B4-BE49-F238E27FC236}">
+                <a16:creationId xmlns:a16="http://schemas.microsoft.com/office/drawing/2014/main" id="{962DE807-C650-A54F-865F-798F1A842CF6}"/>
               </a:ext>
             </a:extLst>
           </p:cNvPr>
@@ -4974,230 +5259,7 @@
         </p:nvSpPr>
         <p:spPr>
           <a:xfrm>
-            <a:off x="2573867" y="2194042"/>
-            <a:ext cx="1964266" cy="314531"/>
-          </a:xfrm>
-          <a:prstGeom prst="ellipse">
-            <a:avLst/>
-          </a:prstGeom>
-        </p:spPr>
-        <p:style>
-          <a:lnRef idx="2">
-            <a:schemeClr val="accent1">
-              <a:shade val="50000"/>
-            </a:schemeClr>
-          </a:lnRef>
-          <a:fillRef idx="1">
-            <a:schemeClr val="accent1"/>
-          </a:fillRef>
-          <a:effectRef idx="0">
-            <a:schemeClr val="accent1"/>
-          </a:effectRef>
-          <a:fontRef idx="minor">
-            <a:schemeClr val="lt1"/>
-          </a:fontRef>
-        </p:style>
-        <p:txBody>
-          <a:bodyPr rtlCol="0" anchor="ctr"/>
-          <a:lstStyle/>
-          <a:p>
-            <a:pPr algn="ctr"/>
-            <a:r>
-              <a:rPr lang="en-IN" sz="1200" dirty="0"/>
-              <a:t>Bottle Neck </a:t>
-            </a:r>
-            <a:endParaRPr lang="en-US" sz="1200" dirty="0"/>
-          </a:p>
-        </p:txBody>
-      </p:sp>
-      <p:sp>
-        <p:nvSpPr>
-          <p:cNvPr id="37" name="Oval 36">
-            <a:extLst>
-              <a:ext uri="{FF2B5EF4-FFF2-40B4-BE49-F238E27FC236}">
-                <a16:creationId xmlns:a16="http://schemas.microsoft.com/office/drawing/2014/main" id="{95F88D9C-2782-314F-A098-2B632BCBD228}"/>
-              </a:ext>
-            </a:extLst>
-          </p:cNvPr>
-          <p:cNvSpPr/>
-          <p:nvPr/>
-        </p:nvSpPr>
-        <p:spPr>
-          <a:xfrm>
-            <a:off x="2350419" y="5423661"/>
-            <a:ext cx="1964266" cy="314531"/>
-          </a:xfrm>
-          <a:prstGeom prst="ellipse">
-            <a:avLst/>
-          </a:prstGeom>
-          <a:solidFill>
-            <a:schemeClr val="accent4">
-              <a:lumMod val="60000"/>
-              <a:lumOff val="40000"/>
-            </a:schemeClr>
-          </a:solidFill>
-        </p:spPr>
-        <p:style>
-          <a:lnRef idx="2">
-            <a:schemeClr val="accent1">
-              <a:shade val="50000"/>
-            </a:schemeClr>
-          </a:lnRef>
-          <a:fillRef idx="1">
-            <a:schemeClr val="accent1"/>
-          </a:fillRef>
-          <a:effectRef idx="0">
-            <a:schemeClr val="accent1"/>
-          </a:effectRef>
-          <a:fontRef idx="minor">
-            <a:schemeClr val="lt1"/>
-          </a:fontRef>
-        </p:style>
-        <p:txBody>
-          <a:bodyPr rtlCol="0" anchor="ctr"/>
-          <a:lstStyle/>
-          <a:p>
-            <a:pPr algn="ctr"/>
-            <a:r>
-              <a:rPr lang="en-IN" sz="1200" dirty="0"/>
-              <a:t>Variance of Process Time</a:t>
-            </a:r>
-            <a:r>
-              <a:rPr lang="en-IN" sz="1200" dirty="0">
-                <a:effectLst/>
-              </a:rPr>
-              <a:t> </a:t>
-            </a:r>
-            <a:endParaRPr lang="en-US" sz="1200" dirty="0"/>
-          </a:p>
-        </p:txBody>
-      </p:sp>
-      <p:sp>
-        <p:nvSpPr>
-          <p:cNvPr id="38" name="Oval 37">
-            <a:extLst>
-              <a:ext uri="{FF2B5EF4-FFF2-40B4-BE49-F238E27FC236}">
-                <a16:creationId xmlns:a16="http://schemas.microsoft.com/office/drawing/2014/main" id="{D601A953-E6B1-6E44-A9EA-D81D4B43E20E}"/>
-              </a:ext>
-            </a:extLst>
-          </p:cNvPr>
-          <p:cNvSpPr/>
-          <p:nvPr/>
-        </p:nvSpPr>
-        <p:spPr>
-          <a:xfrm>
-            <a:off x="8926444" y="4554815"/>
-            <a:ext cx="1964266" cy="314531"/>
-          </a:xfrm>
-          <a:prstGeom prst="ellipse">
-            <a:avLst/>
-          </a:prstGeom>
-          <a:solidFill>
-            <a:schemeClr val="accent5">
-              <a:lumMod val="60000"/>
-              <a:lumOff val="40000"/>
-            </a:schemeClr>
-          </a:solidFill>
-        </p:spPr>
-        <p:style>
-          <a:lnRef idx="2">
-            <a:schemeClr val="accent1">
-              <a:shade val="50000"/>
-            </a:schemeClr>
-          </a:lnRef>
-          <a:fillRef idx="1">
-            <a:schemeClr val="accent1"/>
-          </a:fillRef>
-          <a:effectRef idx="0">
-            <a:schemeClr val="accent1"/>
-          </a:effectRef>
-          <a:fontRef idx="minor">
-            <a:schemeClr val="lt1"/>
-          </a:fontRef>
-        </p:style>
-        <p:txBody>
-          <a:bodyPr rtlCol="0" anchor="ctr"/>
-          <a:lstStyle/>
-          <a:p>
-            <a:pPr algn="ctr"/>
-            <a:r>
-              <a:rPr lang="en-US" sz="1200" dirty="0"/>
-              <a:t>Idle time</a:t>
-            </a:r>
-          </a:p>
-        </p:txBody>
-      </p:sp>
-      <p:sp>
-        <p:nvSpPr>
-          <p:cNvPr id="39" name="Oval 38">
-            <a:extLst>
-              <a:ext uri="{FF2B5EF4-FFF2-40B4-BE49-F238E27FC236}">
-                <a16:creationId xmlns:a16="http://schemas.microsoft.com/office/drawing/2014/main" id="{221D7254-A02C-BE41-84A7-D1C5539FAD19}"/>
-              </a:ext>
-            </a:extLst>
-          </p:cNvPr>
-          <p:cNvSpPr/>
-          <p:nvPr/>
-        </p:nvSpPr>
-        <p:spPr>
-          <a:xfrm>
-            <a:off x="8926444" y="5316815"/>
-            <a:ext cx="1964266" cy="314531"/>
-          </a:xfrm>
-          <a:prstGeom prst="ellipse">
-            <a:avLst/>
-          </a:prstGeom>
-          <a:solidFill>
-            <a:schemeClr val="accent5">
-              <a:lumMod val="60000"/>
-              <a:lumOff val="40000"/>
-            </a:schemeClr>
-          </a:solidFill>
-        </p:spPr>
-        <p:style>
-          <a:lnRef idx="2">
-            <a:schemeClr val="accent1">
-              <a:shade val="50000"/>
-            </a:schemeClr>
-          </a:lnRef>
-          <a:fillRef idx="1">
-            <a:schemeClr val="accent1"/>
-          </a:fillRef>
-          <a:effectRef idx="0">
-            <a:schemeClr val="accent1"/>
-          </a:effectRef>
-          <a:fontRef idx="minor">
-            <a:schemeClr val="lt1"/>
-          </a:fontRef>
-        </p:style>
-        <p:txBody>
-          <a:bodyPr rtlCol="0" anchor="ctr"/>
-          <a:lstStyle/>
-          <a:p>
-            <a:pPr algn="ctr"/>
-            <a:r>
-              <a:rPr lang="en-IN" sz="1200" dirty="0"/>
-              <a:t>Interface or media change</a:t>
-            </a:r>
-            <a:endParaRPr lang="en-US" sz="1200" dirty="0"/>
-          </a:p>
-        </p:txBody>
-      </p:sp>
-      <p:sp>
-        <p:nvSpPr>
-          <p:cNvPr id="40" name="Oval 39">
-            <a:extLst>
-              <a:ext uri="{FF2B5EF4-FFF2-40B4-BE49-F238E27FC236}">
-                <a16:creationId xmlns:a16="http://schemas.microsoft.com/office/drawing/2014/main" id="{703B7FD6-EEF4-F842-916C-A4B5C736A004}"/>
-              </a:ext>
-            </a:extLst>
-          </p:cNvPr>
-          <p:cNvSpPr/>
-          <p:nvPr/>
-        </p:nvSpPr>
-        <p:spPr>
-          <a:xfrm>
-            <a:off x="8940801" y="2138157"/>
+            <a:off x="8912272" y="2151073"/>
             <a:ext cx="1964266" cy="314531"/>
           </a:xfrm>
           <a:prstGeom prst="ellipse">
@@ -5233,68 +5295,6 @@
             <a:pPr algn="ctr"/>
             <a:r>
               <a:rPr lang="en-IN" sz="1200" dirty="0"/>
-              <a:t>Redundant Activity</a:t>
-            </a:r>
-            <a:r>
-              <a:rPr lang="en-IN" sz="1200" dirty="0">
-                <a:effectLst/>
-              </a:rPr>
-              <a:t> </a:t>
-            </a:r>
-            <a:endParaRPr lang="en-US" sz="1200" dirty="0"/>
-          </a:p>
-        </p:txBody>
-      </p:sp>
-      <p:sp>
-        <p:nvSpPr>
-          <p:cNvPr id="41" name="Oval 40">
-            <a:extLst>
-              <a:ext uri="{FF2B5EF4-FFF2-40B4-BE49-F238E27FC236}">
-                <a16:creationId xmlns:a16="http://schemas.microsoft.com/office/drawing/2014/main" id="{962DE807-C650-A54F-865F-798F1A842CF6}"/>
-              </a:ext>
-            </a:extLst>
-          </p:cNvPr>
-          <p:cNvSpPr/>
-          <p:nvPr/>
-        </p:nvSpPr>
-        <p:spPr>
-          <a:xfrm>
-            <a:off x="6764868" y="1951059"/>
-            <a:ext cx="1964266" cy="314531"/>
-          </a:xfrm>
-          <a:prstGeom prst="ellipse">
-            <a:avLst/>
-          </a:prstGeom>
-          <a:solidFill>
-            <a:schemeClr val="accent6">
-              <a:lumMod val="60000"/>
-              <a:lumOff val="40000"/>
-            </a:schemeClr>
-          </a:solidFill>
-        </p:spPr>
-        <p:style>
-          <a:lnRef idx="2">
-            <a:schemeClr val="accent1">
-              <a:shade val="50000"/>
-            </a:schemeClr>
-          </a:lnRef>
-          <a:fillRef idx="1">
-            <a:schemeClr val="accent1"/>
-          </a:fillRef>
-          <a:effectRef idx="0">
-            <a:schemeClr val="accent1"/>
-          </a:effectRef>
-          <a:fontRef idx="minor">
-            <a:schemeClr val="lt1"/>
-          </a:fontRef>
-        </p:style>
-        <p:txBody>
-          <a:bodyPr rtlCol="0" anchor="ctr"/>
-          <a:lstStyle/>
-          <a:p>
-            <a:pPr algn="ctr"/>
-            <a:r>
-              <a:rPr lang="en-IN" sz="1200" dirty="0"/>
               <a:t>Eventually Follows</a:t>
             </a:r>
             <a:endParaRPr lang="en-US" sz="1200" dirty="0"/>
@@ -5315,6 +5315,609 @@
 </file>
 
 <file path=ppt/slides/slide4.xml><?xml version="1.0" encoding="utf-8"?>
+<p:sld xmlns:a="http://schemas.openxmlformats.org/drawingml/2006/main" xmlns:r="http://schemas.openxmlformats.org/officeDocument/2006/relationships" xmlns:p="http://schemas.openxmlformats.org/presentationml/2006/main">
+  <p:cSld>
+    <p:spTree>
+      <p:nvGrpSpPr>
+        <p:cNvPr id="1" name=""/>
+        <p:cNvGrpSpPr/>
+        <p:nvPr/>
+      </p:nvGrpSpPr>
+      <p:grpSpPr>
+        <a:xfrm>
+          <a:off x="0" y="0"/>
+          <a:ext cx="0" cy="0"/>
+          <a:chOff x="0" y="0"/>
+          <a:chExt cx="0" cy="0"/>
+        </a:xfrm>
+      </p:grpSpPr>
+      <p:sp>
+        <p:nvSpPr>
+          <p:cNvPr id="2" name="Title 1">
+            <a:extLst>
+              <a:ext uri="{FF2B5EF4-FFF2-40B4-BE49-F238E27FC236}">
+                <a16:creationId xmlns:a16="http://schemas.microsoft.com/office/drawing/2014/main" id="{2C305BE1-072B-6C48-8CF7-167A85ECE50E}"/>
+              </a:ext>
+            </a:extLst>
+          </p:cNvPr>
+          <p:cNvSpPr>
+            <a:spLocks noGrp="1"/>
+          </p:cNvSpPr>
+          <p:nvPr>
+            <p:ph type="title"/>
+          </p:nvPr>
+        </p:nvSpPr>
+        <p:spPr/>
+        <p:txBody>
+          <a:bodyPr/>
+          <a:lstStyle/>
+          <a:p>
+            <a:r>
+              <a:rPr lang="en-US" dirty="0"/>
+              <a:t>Framework</a:t>
+            </a:r>
+          </a:p>
+        </p:txBody>
+      </p:sp>
+      <p:sp>
+        <p:nvSpPr>
+          <p:cNvPr id="3" name="Content Placeholder 2">
+            <a:extLst>
+              <a:ext uri="{FF2B5EF4-FFF2-40B4-BE49-F238E27FC236}">
+                <a16:creationId xmlns:a16="http://schemas.microsoft.com/office/drawing/2014/main" id="{A985A8C6-F468-4844-AED6-EE3BA768307C}"/>
+              </a:ext>
+            </a:extLst>
+          </p:cNvPr>
+          <p:cNvSpPr>
+            <a:spLocks noGrp="1"/>
+          </p:cNvSpPr>
+          <p:nvPr>
+            <p:ph idx="1"/>
+          </p:nvPr>
+        </p:nvSpPr>
+        <p:spPr/>
+        <p:txBody>
+          <a:bodyPr/>
+          <a:lstStyle/>
+          <a:p>
+            <a:endParaRPr lang="en-US" dirty="0"/>
+          </a:p>
+        </p:txBody>
+      </p:sp>
+      <p:sp>
+        <p:nvSpPr>
+          <p:cNvPr id="4" name="Rectangle 3">
+            <a:extLst>
+              <a:ext uri="{FF2B5EF4-FFF2-40B4-BE49-F238E27FC236}">
+                <a16:creationId xmlns:a16="http://schemas.microsoft.com/office/drawing/2014/main" id="{6FCAC938-F85F-3844-BEEC-B09CCBACE24B}"/>
+              </a:ext>
+            </a:extLst>
+          </p:cNvPr>
+          <p:cNvSpPr/>
+          <p:nvPr/>
+        </p:nvSpPr>
+        <p:spPr>
+          <a:xfrm>
+            <a:off x="999066" y="2667000"/>
+            <a:ext cx="1253067" cy="965200"/>
+          </a:xfrm>
+          <a:prstGeom prst="rect">
+            <a:avLst/>
+          </a:prstGeom>
+        </p:spPr>
+        <p:style>
+          <a:lnRef idx="2">
+            <a:schemeClr val="accent1">
+              <a:shade val="50000"/>
+            </a:schemeClr>
+          </a:lnRef>
+          <a:fillRef idx="1">
+            <a:schemeClr val="accent1"/>
+          </a:fillRef>
+          <a:effectRef idx="0">
+            <a:schemeClr val="accent1"/>
+          </a:effectRef>
+          <a:fontRef idx="minor">
+            <a:schemeClr val="lt1"/>
+          </a:fontRef>
+        </p:style>
+        <p:txBody>
+          <a:bodyPr rtlCol="0" anchor="ctr"/>
+          <a:lstStyle/>
+          <a:p>
+            <a:pPr algn="ctr"/>
+            <a:r>
+              <a:rPr lang="en-US" dirty="0"/>
+              <a:t>Event Log</a:t>
+            </a:r>
+          </a:p>
+        </p:txBody>
+      </p:sp>
+      <p:sp>
+        <p:nvSpPr>
+          <p:cNvPr id="5" name="Rectangle 4">
+            <a:extLst>
+              <a:ext uri="{FF2B5EF4-FFF2-40B4-BE49-F238E27FC236}">
+                <a16:creationId xmlns:a16="http://schemas.microsoft.com/office/drawing/2014/main" id="{48E8AC9E-741D-8D4F-BFA0-826B4401A221}"/>
+              </a:ext>
+            </a:extLst>
+          </p:cNvPr>
+          <p:cNvSpPr/>
+          <p:nvPr/>
+        </p:nvSpPr>
+        <p:spPr>
+          <a:xfrm>
+            <a:off x="2980267" y="2015067"/>
+            <a:ext cx="1608666" cy="2269067"/>
+          </a:xfrm>
+          <a:prstGeom prst="rect">
+            <a:avLst/>
+          </a:prstGeom>
+        </p:spPr>
+        <p:style>
+          <a:lnRef idx="2">
+            <a:schemeClr val="accent1">
+              <a:shade val="50000"/>
+            </a:schemeClr>
+          </a:lnRef>
+          <a:fillRef idx="1">
+            <a:schemeClr val="accent1"/>
+          </a:fillRef>
+          <a:effectRef idx="0">
+            <a:schemeClr val="accent1"/>
+          </a:effectRef>
+          <a:fontRef idx="minor">
+            <a:schemeClr val="lt1"/>
+          </a:fontRef>
+        </p:style>
+        <p:txBody>
+          <a:bodyPr rtlCol="0" anchor="ctr"/>
+          <a:lstStyle/>
+          <a:p>
+            <a:pPr algn="ctr"/>
+            <a:r>
+              <a:rPr lang="en-US" dirty="0"/>
+              <a:t>Cleaning, Timestamp identification, </a:t>
+            </a:r>
+            <a:r>
+              <a:rPr lang="en-US" dirty="0">
+                <a:highlight>
+                  <a:srgbClr val="00FF00"/>
+                </a:highlight>
+              </a:rPr>
+              <a:t>Sorting</a:t>
+            </a:r>
+            <a:r>
+              <a:rPr lang="en-US" dirty="0"/>
+              <a:t>, Scoping of the log</a:t>
+            </a:r>
+          </a:p>
+        </p:txBody>
+      </p:sp>
+      <p:cxnSp>
+        <p:nvCxnSpPr>
+          <p:cNvPr id="7" name="Straight Arrow Connector 6">
+            <a:extLst>
+              <a:ext uri="{FF2B5EF4-FFF2-40B4-BE49-F238E27FC236}">
+                <a16:creationId xmlns:a16="http://schemas.microsoft.com/office/drawing/2014/main" id="{71335A66-8DF4-A249-9D8B-C63468BD4B23}"/>
+              </a:ext>
+            </a:extLst>
+          </p:cNvPr>
+          <p:cNvCxnSpPr>
+            <a:endCxn id="5" idx="1"/>
+          </p:cNvCxnSpPr>
+          <p:nvPr/>
+        </p:nvCxnSpPr>
+        <p:spPr>
+          <a:xfrm>
+            <a:off x="2252133" y="3149600"/>
+            <a:ext cx="728134" cy="1"/>
+          </a:xfrm>
+          <a:prstGeom prst="straightConnector1">
+            <a:avLst/>
+          </a:prstGeom>
+          <a:ln>
+            <a:tailEnd type="triangle"/>
+          </a:ln>
+        </p:spPr>
+        <p:style>
+          <a:lnRef idx="1">
+            <a:schemeClr val="accent1"/>
+          </a:lnRef>
+          <a:fillRef idx="0">
+            <a:schemeClr val="accent1"/>
+          </a:fillRef>
+          <a:effectRef idx="0">
+            <a:schemeClr val="accent1"/>
+          </a:effectRef>
+          <a:fontRef idx="minor">
+            <a:schemeClr val="tx1"/>
+          </a:fontRef>
+        </p:style>
+      </p:cxnSp>
+      <p:sp>
+        <p:nvSpPr>
+          <p:cNvPr id="8" name="Rectangle 7">
+            <a:extLst>
+              <a:ext uri="{FF2B5EF4-FFF2-40B4-BE49-F238E27FC236}">
+                <a16:creationId xmlns:a16="http://schemas.microsoft.com/office/drawing/2014/main" id="{40112CB0-E398-2949-BA82-E1AFF5031B32}"/>
+              </a:ext>
+            </a:extLst>
+          </p:cNvPr>
+          <p:cNvSpPr/>
+          <p:nvPr/>
+        </p:nvSpPr>
+        <p:spPr>
+          <a:xfrm>
+            <a:off x="5283200" y="1976967"/>
+            <a:ext cx="1625600" cy="2421466"/>
+          </a:xfrm>
+          <a:prstGeom prst="rect">
+            <a:avLst/>
+          </a:prstGeom>
+          <a:solidFill>
+            <a:schemeClr val="accent6"/>
+          </a:solidFill>
+        </p:spPr>
+        <p:style>
+          <a:lnRef idx="2">
+            <a:schemeClr val="accent1">
+              <a:shade val="50000"/>
+            </a:schemeClr>
+          </a:lnRef>
+          <a:fillRef idx="1">
+            <a:schemeClr val="accent1"/>
+          </a:fillRef>
+          <a:effectRef idx="0">
+            <a:schemeClr val="accent1"/>
+          </a:effectRef>
+          <a:fontRef idx="minor">
+            <a:schemeClr val="lt1"/>
+          </a:fontRef>
+        </p:style>
+        <p:txBody>
+          <a:bodyPr rtlCol="0" anchor="ctr"/>
+          <a:lstStyle/>
+          <a:p>
+            <a:pPr algn="ctr"/>
+            <a:r>
+              <a:rPr lang="en-US" dirty="0"/>
+              <a:t>Identify the weakness(10 main+ role and decision related)</a:t>
+            </a:r>
+          </a:p>
+        </p:txBody>
+      </p:sp>
+      <p:cxnSp>
+        <p:nvCxnSpPr>
+          <p:cNvPr id="10" name="Straight Arrow Connector 9">
+            <a:extLst>
+              <a:ext uri="{FF2B5EF4-FFF2-40B4-BE49-F238E27FC236}">
+                <a16:creationId xmlns:a16="http://schemas.microsoft.com/office/drawing/2014/main" id="{601DBE6F-170F-0E45-8072-7CBB0743D18B}"/>
+              </a:ext>
+            </a:extLst>
+          </p:cNvPr>
+          <p:cNvCxnSpPr>
+            <a:stCxn id="5" idx="3"/>
+          </p:cNvCxnSpPr>
+          <p:nvPr/>
+        </p:nvCxnSpPr>
+        <p:spPr>
+          <a:xfrm>
+            <a:off x="4588933" y="3149601"/>
+            <a:ext cx="728134" cy="76199"/>
+          </a:xfrm>
+          <a:prstGeom prst="straightConnector1">
+            <a:avLst/>
+          </a:prstGeom>
+          <a:ln>
+            <a:tailEnd type="triangle"/>
+          </a:ln>
+        </p:spPr>
+        <p:style>
+          <a:lnRef idx="1">
+            <a:schemeClr val="accent1"/>
+          </a:lnRef>
+          <a:fillRef idx="0">
+            <a:schemeClr val="accent1"/>
+          </a:fillRef>
+          <a:effectRef idx="0">
+            <a:schemeClr val="accent1"/>
+          </a:effectRef>
+          <a:fontRef idx="minor">
+            <a:schemeClr val="tx1"/>
+          </a:fontRef>
+        </p:style>
+      </p:cxnSp>
+      <p:sp>
+        <p:nvSpPr>
+          <p:cNvPr id="11" name="Rectangle 10">
+            <a:extLst>
+              <a:ext uri="{FF2B5EF4-FFF2-40B4-BE49-F238E27FC236}">
+                <a16:creationId xmlns:a16="http://schemas.microsoft.com/office/drawing/2014/main" id="{DA2BFEC7-B30C-5348-89F9-847ADE3555AD}"/>
+              </a:ext>
+            </a:extLst>
+          </p:cNvPr>
+          <p:cNvSpPr/>
+          <p:nvPr/>
+        </p:nvSpPr>
+        <p:spPr>
+          <a:xfrm>
+            <a:off x="4457699" y="5215467"/>
+            <a:ext cx="1638301" cy="961496"/>
+          </a:xfrm>
+          <a:prstGeom prst="rect">
+            <a:avLst/>
+          </a:prstGeom>
+          <a:solidFill>
+            <a:schemeClr val="accent6"/>
+          </a:solidFill>
+        </p:spPr>
+        <p:style>
+          <a:lnRef idx="2">
+            <a:schemeClr val="accent1">
+              <a:shade val="50000"/>
+            </a:schemeClr>
+          </a:lnRef>
+          <a:fillRef idx="1">
+            <a:schemeClr val="accent1"/>
+          </a:fillRef>
+          <a:effectRef idx="0">
+            <a:schemeClr val="accent1"/>
+          </a:effectRef>
+          <a:fontRef idx="minor">
+            <a:schemeClr val="lt1"/>
+          </a:fontRef>
+        </p:style>
+        <p:txBody>
+          <a:bodyPr rtlCol="0" anchor="ctr"/>
+          <a:lstStyle/>
+          <a:p>
+            <a:pPr algn="ctr"/>
+            <a:r>
+              <a:rPr lang="en-US" dirty="0"/>
+              <a:t>Expert input for weakness identification</a:t>
+            </a:r>
+          </a:p>
+        </p:txBody>
+      </p:sp>
+      <p:cxnSp>
+        <p:nvCxnSpPr>
+          <p:cNvPr id="13" name="Straight Arrow Connector 12">
+            <a:extLst>
+              <a:ext uri="{FF2B5EF4-FFF2-40B4-BE49-F238E27FC236}">
+                <a16:creationId xmlns:a16="http://schemas.microsoft.com/office/drawing/2014/main" id="{E7C7AB7D-998D-014F-B35C-19981A1B3EEF}"/>
+              </a:ext>
+            </a:extLst>
+          </p:cNvPr>
+          <p:cNvCxnSpPr/>
+          <p:nvPr/>
+        </p:nvCxnSpPr>
+        <p:spPr>
+          <a:xfrm flipV="1">
+            <a:off x="5283200" y="4398433"/>
+            <a:ext cx="783165" cy="893233"/>
+          </a:xfrm>
+          <a:prstGeom prst="straightConnector1">
+            <a:avLst/>
+          </a:prstGeom>
+          <a:ln>
+            <a:tailEnd type="triangle"/>
+          </a:ln>
+        </p:spPr>
+        <p:style>
+          <a:lnRef idx="1">
+            <a:schemeClr val="accent1"/>
+          </a:lnRef>
+          <a:fillRef idx="0">
+            <a:schemeClr val="accent1"/>
+          </a:fillRef>
+          <a:effectRef idx="0">
+            <a:schemeClr val="accent1"/>
+          </a:effectRef>
+          <a:fontRef idx="minor">
+            <a:schemeClr val="tx1"/>
+          </a:fontRef>
+        </p:style>
+      </p:cxnSp>
+      <p:sp>
+        <p:nvSpPr>
+          <p:cNvPr id="14" name="Rectangle 13">
+            <a:extLst>
+              <a:ext uri="{FF2B5EF4-FFF2-40B4-BE49-F238E27FC236}">
+                <a16:creationId xmlns:a16="http://schemas.microsoft.com/office/drawing/2014/main" id="{E237D8D6-F82B-5842-93E3-F68B235A535C}"/>
+              </a:ext>
+            </a:extLst>
+          </p:cNvPr>
+          <p:cNvSpPr/>
+          <p:nvPr/>
+        </p:nvSpPr>
+        <p:spPr>
+          <a:xfrm>
+            <a:off x="8128000" y="2129366"/>
+            <a:ext cx="1811867" cy="2116668"/>
+          </a:xfrm>
+          <a:prstGeom prst="rect">
+            <a:avLst/>
+          </a:prstGeom>
+          <a:solidFill>
+            <a:schemeClr val="accent6"/>
+          </a:solidFill>
+        </p:spPr>
+        <p:style>
+          <a:lnRef idx="2">
+            <a:schemeClr val="accent1">
+              <a:shade val="50000"/>
+            </a:schemeClr>
+          </a:lnRef>
+          <a:fillRef idx="1">
+            <a:schemeClr val="accent1"/>
+          </a:fillRef>
+          <a:effectRef idx="0">
+            <a:schemeClr val="accent1"/>
+          </a:effectRef>
+          <a:fontRef idx="minor">
+            <a:schemeClr val="lt1"/>
+          </a:fontRef>
+        </p:style>
+        <p:txBody>
+          <a:bodyPr rtlCol="0" anchor="ctr"/>
+          <a:lstStyle/>
+          <a:p>
+            <a:pPr algn="ctr"/>
+            <a:r>
+              <a:rPr lang="en-US" dirty="0" err="1"/>
+              <a:t>Dataframe</a:t>
+            </a:r>
+            <a:r>
+              <a:rPr lang="en-US" dirty="0"/>
+              <a:t> as excel indicating weakness and its occurrence level</a:t>
+            </a:r>
+          </a:p>
+        </p:txBody>
+      </p:sp>
+      <p:cxnSp>
+        <p:nvCxnSpPr>
+          <p:cNvPr id="16" name="Straight Arrow Connector 15">
+            <a:extLst>
+              <a:ext uri="{FF2B5EF4-FFF2-40B4-BE49-F238E27FC236}">
+                <a16:creationId xmlns:a16="http://schemas.microsoft.com/office/drawing/2014/main" id="{96F3E4CB-83F5-384A-8D57-10EA0DBDF910}"/>
+              </a:ext>
+            </a:extLst>
+          </p:cNvPr>
+          <p:cNvCxnSpPr>
+            <a:endCxn id="14" idx="1"/>
+          </p:cNvCxnSpPr>
+          <p:nvPr/>
+        </p:nvCxnSpPr>
+        <p:spPr>
+          <a:xfrm flipV="1">
+            <a:off x="6925733" y="3187700"/>
+            <a:ext cx="1202267" cy="38100"/>
+          </a:xfrm>
+          <a:prstGeom prst="straightConnector1">
+            <a:avLst/>
+          </a:prstGeom>
+          <a:ln>
+            <a:tailEnd type="triangle"/>
+          </a:ln>
+        </p:spPr>
+        <p:style>
+          <a:lnRef idx="1">
+            <a:schemeClr val="accent1"/>
+          </a:lnRef>
+          <a:fillRef idx="0">
+            <a:schemeClr val="accent1"/>
+          </a:fillRef>
+          <a:effectRef idx="0">
+            <a:schemeClr val="accent1"/>
+          </a:effectRef>
+          <a:fontRef idx="minor">
+            <a:schemeClr val="tx1"/>
+          </a:fontRef>
+        </p:style>
+      </p:cxnSp>
+      <p:sp>
+        <p:nvSpPr>
+          <p:cNvPr id="17" name="Rectangle 16">
+            <a:extLst>
+              <a:ext uri="{FF2B5EF4-FFF2-40B4-BE49-F238E27FC236}">
+                <a16:creationId xmlns:a16="http://schemas.microsoft.com/office/drawing/2014/main" id="{336C6009-AEB0-2842-9335-1CA3447437B0}"/>
+              </a:ext>
+            </a:extLst>
+          </p:cNvPr>
+          <p:cNvSpPr/>
+          <p:nvPr/>
+        </p:nvSpPr>
+        <p:spPr>
+          <a:xfrm>
+            <a:off x="8314267" y="4792133"/>
+            <a:ext cx="2878667" cy="1384830"/>
+          </a:xfrm>
+          <a:prstGeom prst="rect">
+            <a:avLst/>
+          </a:prstGeom>
+        </p:spPr>
+        <p:style>
+          <a:lnRef idx="2">
+            <a:schemeClr val="accent1">
+              <a:shade val="50000"/>
+            </a:schemeClr>
+          </a:lnRef>
+          <a:fillRef idx="1">
+            <a:schemeClr val="accent1"/>
+          </a:fillRef>
+          <a:effectRef idx="0">
+            <a:schemeClr val="accent1"/>
+          </a:effectRef>
+          <a:fontRef idx="minor">
+            <a:schemeClr val="lt1"/>
+          </a:fontRef>
+        </p:style>
+        <p:txBody>
+          <a:bodyPr rtlCol="0" anchor="ctr"/>
+          <a:lstStyle/>
+          <a:p>
+            <a:pPr algn="ctr"/>
+            <a:r>
+              <a:rPr lang="en-US" dirty="0"/>
+              <a:t>UI</a:t>
+            </a:r>
+          </a:p>
+        </p:txBody>
+      </p:sp>
+      <p:cxnSp>
+        <p:nvCxnSpPr>
+          <p:cNvPr id="19" name="Straight Arrow Connector 18">
+            <a:extLst>
+              <a:ext uri="{FF2B5EF4-FFF2-40B4-BE49-F238E27FC236}">
+                <a16:creationId xmlns:a16="http://schemas.microsoft.com/office/drawing/2014/main" id="{57D32C9F-0799-E74F-A689-91D5610B214A}"/>
+              </a:ext>
+            </a:extLst>
+          </p:cNvPr>
+          <p:cNvCxnSpPr/>
+          <p:nvPr/>
+        </p:nvCxnSpPr>
+        <p:spPr>
+          <a:xfrm>
+            <a:off x="9008533" y="4284134"/>
+            <a:ext cx="745067" cy="507999"/>
+          </a:xfrm>
+          <a:prstGeom prst="straightConnector1">
+            <a:avLst/>
+          </a:prstGeom>
+          <a:ln>
+            <a:tailEnd type="triangle"/>
+          </a:ln>
+        </p:spPr>
+        <p:style>
+          <a:lnRef idx="1">
+            <a:schemeClr val="accent1"/>
+          </a:lnRef>
+          <a:fillRef idx="0">
+            <a:schemeClr val="accent1"/>
+          </a:fillRef>
+          <a:effectRef idx="0">
+            <a:schemeClr val="accent1"/>
+          </a:effectRef>
+          <a:fontRef idx="minor">
+            <a:schemeClr val="tx1"/>
+          </a:fontRef>
+        </p:style>
+      </p:cxnSp>
+    </p:spTree>
+    <p:extLst>
+      <p:ext uri="{BB962C8B-B14F-4D97-AF65-F5344CB8AC3E}">
+        <p14:creationId xmlns:p14="http://schemas.microsoft.com/office/powerpoint/2010/main" val="2154488540"/>
+      </p:ext>
+    </p:extLst>
+  </p:cSld>
+  <p:clrMapOvr>
+    <a:masterClrMapping/>
+  </p:clrMapOvr>
+</p:sld>
+</file>
+
+<file path=ppt/slides/slide5.xml><?xml version="1.0" encoding="utf-8"?>
 <p:sld xmlns:a="http://schemas.openxmlformats.org/drawingml/2006/main" xmlns:r="http://schemas.openxmlformats.org/officeDocument/2006/relationships" xmlns:p="http://schemas.openxmlformats.org/presentationml/2006/main">
   <p:cSld>
     <p:spTree>

</xml_diff>